<commit_message>
added week 9 meetings details fixed week 8 meeting_notes typo
</commit_message>
<xml_diff>
--- a/meetings/week 9/week9_presentation.pptx
+++ b/meetings/week 9/week9_presentation.pptx
@@ -4853,12 +4853,12 @@
               <a:t> (followed by potential core revamp using new </a:t>
             </a:r>
             <a:r>
-              <a:rPr lang="en-US"/>
-              <a:t>transpiler) </a:t>
-            </a:r>
-            <a:r>
-              <a:rPr lang="en-US" dirty="0"/>
-              <a:t>and online IDE for next semester</a:t>
+              <a:rPr lang="en-US" dirty="0" err="1"/>
+              <a:t>transpiler</a:t>
+            </a:r>
+            <a:r>
+              <a:rPr lang="en-US" dirty="0"/>
+              <a:t>) and online IDE for next semester</a:t>
             </a:r>
           </a:p>
           <a:p>

</xml_diff>

<commit_message>
updated week 9 discussion
</commit_message>
<xml_diff>
--- a/meetings/week 9/week9_presentation.pptx
+++ b/meetings/week 9/week9_presentation.pptx
@@ -110,6 +110,11 @@
       </a:defRPr>
     </a:lvl9pPr>
   </p:defaultTextStyle>
+  <p:extLst>
+    <p:ext uri="{EFAFB233-063F-42B5-8137-9DF3F51BA10A}">
+      <p15:sldGuideLst xmlns:p15="http://schemas.microsoft.com/office/powerpoint/2012/main"/>
+    </p:ext>
+  </p:extLst>
 </p:presentation>
 </file>
 
@@ -271,7 +276,7 @@
           <a:p>
             <a:fld id="{AE3425CA-4B9D-4420-BB9E-C250DB30E421}" type="datetime1">
               <a:rPr lang="en-US" smtClean="0"/>
-              <a:t>11/14/22</a:t>
+              <a:t>11/16/22</a:t>
             </a:fld>
             <a:endParaRPr lang="en-US"/>
           </a:p>
@@ -512,7 +517,7 @@
           <a:p>
             <a:fld id="{6A14B861-3779-4E37-8DF0-E9EB3EA96210}" type="datetime1">
               <a:rPr lang="en-US" smtClean="0"/>
-              <a:t>11/14/22</a:t>
+              <a:t>11/16/22</a:t>
             </a:fld>
             <a:endParaRPr lang="en-US"/>
           </a:p>
@@ -722,7 +727,7 @@
           <a:p>
             <a:fld id="{53E38388-E864-4553-9937-AE9FC5E50CFC}" type="datetime1">
               <a:rPr lang="en-US" smtClean="0"/>
-              <a:t>11/14/22</a:t>
+              <a:t>11/16/22</a:t>
             </a:fld>
             <a:endParaRPr lang="en-US"/>
           </a:p>
@@ -921,7 +926,7 @@
           <a:p>
             <a:fld id="{62751E1E-C50D-4FD4-8B1E-ECD78340D9AB}" type="datetime1">
               <a:rPr lang="en-US" smtClean="0"/>
-              <a:t>11/14/22</a:t>
+              <a:t>11/16/22</a:t>
             </a:fld>
             <a:endParaRPr lang="en-US"/>
           </a:p>
@@ -1209,7 +1214,7 @@
           <a:p>
             <a:fld id="{43C83AFB-9E54-459E-8C6D-0913AC3BA5D7}" type="datetime1">
               <a:rPr lang="en-US" smtClean="0"/>
-              <a:t>11/14/22</a:t>
+              <a:t>11/16/22</a:t>
             </a:fld>
             <a:endParaRPr lang="en-US"/>
           </a:p>
@@ -1525,7 +1530,7 @@
           <a:p>
             <a:fld id="{F10144B6-0CA7-46BA-A00B-1E68E5C3ED0C}" type="datetime1">
               <a:rPr lang="en-US" smtClean="0"/>
-              <a:t>11/14/22</a:t>
+              <a:t>11/16/22</a:t>
             </a:fld>
             <a:endParaRPr lang="en-US"/>
           </a:p>
@@ -2057,7 +2062,7 @@
           <a:p>
             <a:fld id="{0051F549-537C-41EC-B9CC-5B6A9AC2A6A7}" type="datetime1">
               <a:rPr lang="en-US" smtClean="0"/>
-              <a:t>11/14/22</a:t>
+              <a:t>11/16/22</a:t>
             </a:fld>
             <a:endParaRPr lang="en-US"/>
           </a:p>
@@ -2284,7 +2289,7 @@
           <a:p>
             <a:fld id="{952F8D56-3D0E-48B8-8218-1F3A06A96C62}" type="datetime1">
               <a:rPr lang="en-US" smtClean="0"/>
-              <a:t>11/14/22</a:t>
+              <a:t>11/16/22</a:t>
             </a:fld>
             <a:endParaRPr lang="en-US"/>
           </a:p>
@@ -2397,7 +2402,7 @@
           <a:p>
             <a:fld id="{E8EC309E-27D4-401F-A74A-DEA16C7B51DC}" type="datetime1">
               <a:rPr lang="en-US" smtClean="0"/>
-              <a:t>11/14/22</a:t>
+              <a:t>11/16/22</a:t>
             </a:fld>
             <a:endParaRPr lang="en-US"/>
           </a:p>
@@ -2723,7 +2728,7 @@
           <a:p>
             <a:fld id="{6DEA2B81-2BC3-42D7-B67D-05C685AA80AD}" type="datetime1">
               <a:rPr lang="en-US" smtClean="0"/>
-              <a:t>11/14/22</a:t>
+              <a:t>11/16/22</a:t>
             </a:fld>
             <a:endParaRPr lang="en-US"/>
           </a:p>
@@ -3041,7 +3046,7 @@
           <a:p>
             <a:fld id="{F0DB8F2B-E487-4905-B553-FB649F2B6F23}" type="datetime1">
               <a:rPr lang="en-US" smtClean="0"/>
-              <a:t>11/14/22</a:t>
+              <a:t>11/16/22</a:t>
             </a:fld>
             <a:endParaRPr lang="en-US"/>
           </a:p>
@@ -3284,7 +3289,7 @@
           <a:p>
             <a:fld id="{6EF7C3A7-D6F6-4D38-A7C3-B72967BB81A6}" type="datetime1">
               <a:rPr lang="en-US" smtClean="0"/>
-              <a:t>11/14/22</a:t>
+              <a:t>11/16/22</a:t>
             </a:fld>
             <a:endParaRPr lang="en-US"/>
           </a:p>
@@ -4561,7 +4566,7 @@
         <p:spPr/>
         <p:txBody>
           <a:bodyPr>
-            <a:normAutofit fontScale="77500" lnSpcReduction="20000"/>
+            <a:normAutofit fontScale="70000" lnSpcReduction="20000"/>
           </a:bodyPr>
           <a:lstStyle/>
           <a:p>
@@ -4592,7 +4597,15 @@
             </a:r>
             <a:r>
               <a:rPr lang="en-US" dirty="0"/>
-              <a:t> the webpack file was changed to accommodate this.</a:t>
+              <a:t> the webpack file was changed to accommodate this. (in these packages the default is set with </a:t>
+            </a:r>
+            <a:r>
+              <a:rPr lang="en-US" dirty="0" err="1"/>
+              <a:t>peer.html</a:t>
+            </a:r>
+            <a:r>
+              <a:rPr lang="en-US" dirty="0"/>
+              <a:t> in mind).</a:t>
             </a:r>
           </a:p>
           <a:p>
@@ -4651,6 +4664,12 @@
             <a:r>
               <a:rPr lang="en-US" dirty="0"/>
               <a:t>Have started making notes for dissertation.</a:t>
+            </a:r>
+          </a:p>
+          <a:p>
+            <a:r>
+              <a:rPr lang="en-US" dirty="0"/>
+              <a:t>Have written first draft abstract</a:t>
             </a:r>
           </a:p>
         </p:txBody>

</xml_diff>